<commit_message>
added missing reports logo
</commit_message>
<xml_diff>
--- a/When 2 Work/First_Login.pptx
+++ b/When 2 Work/First_Login.pptx
@@ -6283,7 +6283,7 @@
       <p:sp>
         <p:nvSpPr>
           <p:cNvPr id="8" name="Rectangle 7">
-            <a:hlinkClick r:id="" action="ppaction://hlinkshowjump?jump=nextslide"/>
+            <a:hlinkClick r:id="rId3" action="ppaction://hlinksldjump"/>
           </p:cNvPr>
           <p:cNvSpPr/>
           <p:nvPr/>
@@ -6292,6 +6292,58 @@
           <a:xfrm>
             <a:off x="4850296" y="1256306"/>
             <a:ext cx="978010" cy="254442"/>
+          </a:xfrm>
+          <a:prstGeom prst="rect">
+            <a:avLst/>
+          </a:prstGeom>
+          <a:solidFill>
+            <a:srgbClr val="4472C4">
+              <a:alpha val="0"/>
+            </a:srgbClr>
+          </a:solidFill>
+          <a:ln>
+            <a:solidFill>
+              <a:srgbClr val="49702E"/>
+            </a:solidFill>
+          </a:ln>
+        </p:spPr>
+        <p:style>
+          <a:lnRef idx="2">
+            <a:schemeClr val="accent1">
+              <a:shade val="50000"/>
+            </a:schemeClr>
+          </a:lnRef>
+          <a:fillRef idx="1">
+            <a:schemeClr val="accent1"/>
+          </a:fillRef>
+          <a:effectRef idx="0">
+            <a:schemeClr val="accent1"/>
+          </a:effectRef>
+          <a:fontRef idx="minor">
+            <a:schemeClr val="lt1"/>
+          </a:fontRef>
+        </p:style>
+        <p:txBody>
+          <a:bodyPr rtlCol="0" anchor="ctr"/>
+          <a:lstStyle/>
+          <a:p>
+            <a:pPr algn="ctr"/>
+            <a:endParaRPr lang="en-US"/>
+          </a:p>
+        </p:txBody>
+      </p:sp>
+      <p:sp>
+        <p:nvSpPr>
+          <p:cNvPr id="9" name="Rectangle 8">
+            <a:hlinkClick r:id="rId3" action="ppaction://hlinksldjump"/>
+          </p:cNvPr>
+          <p:cNvSpPr/>
+          <p:nvPr/>
+        </p:nvSpPr>
+        <p:spPr>
+          <a:xfrm>
+            <a:off x="4090457" y="5285117"/>
+            <a:ext cx="978010" cy="252772"/>
           </a:xfrm>
           <a:prstGeom prst="rect">
             <a:avLst/>

</xml_diff>